<commit_message>
plausiblere Business-Historie, auch als Grafik
</commit_message>
<xml_diff>
--- a/graphics/samm-business-history.pptx
+++ b/graphics/samm-business-history.pptx
@@ -192,7 +192,7 @@
           <a:p>
             <a:fld id="{1C8FE042-0B66-6B40-B0E0-26B8EBC13308}" type="datetimeFigureOut">
               <a:rPr lang="de-DE" smtClean="0"/>
-              <a:t>18.04.15</a:t>
+              <a:t>26.04.15</a:t>
             </a:fld>
             <a:endParaRPr lang="de-DE"/>
           </a:p>
@@ -1677,8 +1677,8 @@
         </p:nvCxnSpPr>
         <p:spPr>
           <a:xfrm flipV="1">
-            <a:off x="296506" y="3956362"/>
-            <a:ext cx="7718208" cy="24422"/>
+            <a:off x="170381" y="3150717"/>
+            <a:ext cx="8117433" cy="24422"/>
           </a:xfrm>
           <a:prstGeom prst="straightConnector1">
             <a:avLst/>
@@ -1710,7 +1710,7 @@
         </p:nvSpPr>
         <p:spPr>
           <a:xfrm>
-            <a:off x="235446" y="4124314"/>
+            <a:off x="235446" y="3318669"/>
             <a:ext cx="704640" cy="400110"/>
           </a:xfrm>
           <a:prstGeom prst="rect">
@@ -1740,7 +1740,7 @@
         </p:nvSpPr>
         <p:spPr>
           <a:xfrm>
-            <a:off x="2012104" y="4130182"/>
+            <a:off x="2012104" y="3324537"/>
             <a:ext cx="704640" cy="400110"/>
           </a:xfrm>
           <a:prstGeom prst="rect">
@@ -1770,7 +1770,7 @@
         </p:nvSpPr>
         <p:spPr>
           <a:xfrm>
-            <a:off x="3703244" y="4130182"/>
+            <a:off x="3703244" y="3324537"/>
             <a:ext cx="704640" cy="400110"/>
           </a:xfrm>
           <a:prstGeom prst="rect">
@@ -1800,7 +1800,7 @@
         </p:nvSpPr>
         <p:spPr>
           <a:xfrm>
-            <a:off x="5638645" y="4124314"/>
+            <a:off x="5706920" y="3318669"/>
             <a:ext cx="704640" cy="400110"/>
           </a:xfrm>
           <a:prstGeom prst="rect">
@@ -1830,7 +1830,7 @@
         </p:nvSpPr>
         <p:spPr>
           <a:xfrm>
-            <a:off x="7219894" y="4124314"/>
+            <a:off x="7219894" y="3318669"/>
             <a:ext cx="704640" cy="400110"/>
           </a:xfrm>
           <a:prstGeom prst="rect">
@@ -1860,7 +1860,7 @@
         </p:nvSpPr>
         <p:spPr>
           <a:xfrm>
-            <a:off x="296506" y="5153041"/>
+            <a:off x="296506" y="4797244"/>
             <a:ext cx="3986453" cy="573917"/>
           </a:xfrm>
           <a:prstGeom prst="rect">
@@ -1909,8 +1909,8 @@
         </p:nvSpPr>
         <p:spPr>
           <a:xfrm>
-            <a:off x="2619794" y="4316839"/>
-            <a:ext cx="1095193" cy="543622"/>
+            <a:off x="1870791" y="3934499"/>
+            <a:ext cx="1912472" cy="543622"/>
           </a:xfrm>
           <a:prstGeom prst="rect">
             <a:avLst/>
@@ -1951,7 +1951,7 @@
         </p:nvSpPr>
         <p:spPr>
           <a:xfrm>
-            <a:off x="2716744" y="2172613"/>
+            <a:off x="2619131" y="1910150"/>
             <a:ext cx="2107137" cy="598813"/>
           </a:xfrm>
           <a:prstGeom prst="rect">
@@ -1978,10 +1978,10 @@
           <a:p>
             <a:pPr algn="ctr"/>
             <a:r>
-              <a:rPr lang="de-DE" sz="1600" dirty="0" smtClean="0"/>
+              <a:rPr lang="de-DE" sz="2000" dirty="0" smtClean="0"/>
               <a:t>Rot AG</a:t>
             </a:r>
-            <a:endParaRPr lang="de-DE" sz="1600" dirty="0"/>
+            <a:endParaRPr lang="de-DE" sz="2000" dirty="0"/>
           </a:p>
         </p:txBody>
       </p:sp>
@@ -1993,8 +1993,8 @@
         </p:nvSpPr>
         <p:spPr>
           <a:xfrm>
-            <a:off x="1550969" y="6068863"/>
-            <a:ext cx="2185529" cy="430557"/>
+            <a:off x="1734262" y="5792692"/>
+            <a:ext cx="2799332" cy="430557"/>
           </a:xfrm>
           <a:prstGeom prst="rect">
             <a:avLst/>
@@ -2048,15 +2048,23 @@
           <p:nvPr/>
         </p:nvCxnSpPr>
         <p:spPr>
-          <a:xfrm>
-            <a:off x="3714987" y="4588650"/>
-            <a:ext cx="692897" cy="359740"/>
+          <a:xfrm flipV="1">
+            <a:off x="3783263" y="4199769"/>
+            <a:ext cx="849977" cy="6541"/>
           </a:xfrm>
           <a:prstGeom prst="curvedConnector3">
             <a:avLst>
               <a:gd name="adj1" fmla="val 50000"/>
             </a:avLst>
           </a:prstGeom>
+          <a:ln w="22225">
+            <a:solidFill>
+              <a:schemeClr val="accent3"/>
+            </a:solidFill>
+            <a:prstDash val="sysDash"/>
+            <a:headEnd type="none"/>
+            <a:tailEnd type="arrow" w="lg" len="med"/>
+          </a:ln>
         </p:spPr>
         <p:style>
           <a:lnRef idx="2">
@@ -2081,7 +2089,7 @@
         </p:nvSpPr>
         <p:spPr>
           <a:xfrm>
-            <a:off x="4407884" y="4609419"/>
+            <a:off x="4633240" y="3860798"/>
             <a:ext cx="1987145" cy="677942"/>
           </a:xfrm>
           <a:prstGeom prst="rect">
@@ -2141,12 +2149,19 @@
         </p:nvCxnSpPr>
         <p:spPr>
           <a:xfrm flipV="1">
-            <a:off x="3736498" y="5287361"/>
-            <a:ext cx="1664959" cy="996781"/>
+            <a:off x="4533594" y="4538740"/>
+            <a:ext cx="1093219" cy="1469231"/>
           </a:xfrm>
           <a:prstGeom prst="curvedConnector2">
             <a:avLst/>
           </a:prstGeom>
+          <a:ln>
+            <a:solidFill>
+              <a:srgbClr val="7EC251"/>
+            </a:solidFill>
+            <a:headEnd type="none"/>
+            <a:tailEnd type="arrow"/>
+          </a:ln>
         </p:spPr>
         <p:style>
           <a:lnRef idx="2">
@@ -2171,8 +2186,8 @@
         </p:nvSpPr>
         <p:spPr>
           <a:xfrm>
-            <a:off x="5115683" y="1404264"/>
-            <a:ext cx="1435992" cy="834801"/>
+            <a:off x="4835623" y="1335426"/>
+            <a:ext cx="1837675" cy="768349"/>
           </a:xfrm>
           <a:prstGeom prst="rect">
             <a:avLst/>
@@ -2220,15 +2235,31 @@
           <a:p>
             <a:pPr algn="ctr"/>
             <a:r>
+              <a:rPr lang="de-DE" sz="2000" dirty="0" smtClean="0"/>
+              <a:t>Rot Holding</a:t>
+            </a:r>
+            <a:r>
+              <a:rPr lang="de-DE" dirty="0" smtClean="0"/>
+              <a:t> </a:t>
+            </a:r>
+            <a:r>
+              <a:rPr lang="de-DE" dirty="0" smtClean="0"/>
+              <a:t/>
+            </a:r>
+            <a:br>
+              <a:rPr lang="de-DE" dirty="0" smtClean="0"/>
+            </a:br>
+            <a:r>
+              <a:rPr lang="de-DE" dirty="0" smtClean="0"/>
+              <a:t>+ </a:t>
+            </a:r>
+            <a:r>
               <a:rPr lang="de-DE" sz="1600" dirty="0" smtClean="0"/>
-              <a:t>Rot Holding +</a:t>
-            </a:r>
-            <a:br>
+              <a:t>Rot </a:t>
+            </a:r>
+            <a:r>
               <a:rPr lang="de-DE" sz="1600" dirty="0" smtClean="0"/>
-            </a:br>
-            <a:r>
-              <a:rPr lang="de-DE" sz="1600" dirty="0" smtClean="0"/>
-              <a:t>Rot Europa</a:t>
+              <a:t>Europa</a:t>
             </a:r>
             <a:endParaRPr lang="de-DE" sz="1600" dirty="0"/>
           </a:p>
@@ -2237,15 +2268,13 @@
       <p:cxnSp>
         <p:nvCxnSpPr>
           <p:cNvPr id="52" name="Gerade Verbindung mit Pfeil 51"/>
-          <p:cNvCxnSpPr>
-            <a:stCxn id="16" idx="0"/>
-          </p:cNvCxnSpPr>
+          <p:cNvCxnSpPr/>
           <p:nvPr/>
         </p:nvCxnSpPr>
         <p:spPr>
-          <a:xfrm flipV="1">
-            <a:off x="3167391" y="2244934"/>
-            <a:ext cx="2391147" cy="2071905"/>
+          <a:xfrm>
+            <a:off x="3209020" y="2508963"/>
+            <a:ext cx="0" cy="1351835"/>
           </a:xfrm>
           <a:prstGeom prst="straightConnector1">
             <a:avLst/>
@@ -2257,6 +2286,7 @@
                 <a:lumOff val="40000"/>
               </a:schemeClr>
             </a:solidFill>
+            <a:prstDash val="sysDash"/>
             <a:tailEnd type="arrow"/>
           </a:ln>
         </p:spPr>
@@ -2279,14 +2309,14 @@
         <p:nvCxnSpPr>
           <p:cNvPr id="53" name="Gerade Verbindung mit Pfeil 52"/>
           <p:cNvCxnSpPr>
-            <a:stCxn id="30" idx="0"/>
+            <a:endCxn id="30" idx="0"/>
           </p:cNvCxnSpPr>
           <p:nvPr/>
         </p:nvCxnSpPr>
         <p:spPr>
-          <a:xfrm flipV="1">
-            <a:off x="5401457" y="1821665"/>
-            <a:ext cx="1818437" cy="2787754"/>
+          <a:xfrm>
+            <a:off x="4726268" y="2508963"/>
+            <a:ext cx="900545" cy="1351835"/>
           </a:xfrm>
           <a:prstGeom prst="straightConnector1">
             <a:avLst/>
@@ -2297,6 +2327,7 @@
                 <a:lumMod val="75000"/>
               </a:schemeClr>
             </a:solidFill>
+            <a:prstDash val="sysDash"/>
             <a:tailEnd type="arrow"/>
           </a:ln>
         </p:spPr>
@@ -2326,8 +2357,8 @@
         </p:nvCxnSpPr>
         <p:spPr>
           <a:xfrm rot="5400000" flipH="1" flipV="1">
-            <a:off x="4267524" y="1324454"/>
-            <a:ext cx="350948" cy="1345370"/>
+            <a:off x="4158887" y="1233415"/>
+            <a:ext cx="190549" cy="1162923"/>
           </a:xfrm>
           <a:prstGeom prst="curvedConnector2">
             <a:avLst/>
@@ -2360,8 +2391,8 @@
         </p:nvSpPr>
         <p:spPr>
           <a:xfrm>
-            <a:off x="6863345" y="442463"/>
-            <a:ext cx="1550462" cy="1376908"/>
+            <a:off x="6863344" y="442463"/>
+            <a:ext cx="1736059" cy="1376908"/>
           </a:xfrm>
           <a:prstGeom prst="rect">
             <a:avLst/>
@@ -2374,30 +2405,17 @@
                   <a:lumOff val="40000"/>
                 </a:schemeClr>
               </a:gs>
-              <a:gs pos="100000">
+              <a:gs pos="75000">
                 <a:schemeClr val="accent4">
                   <a:lumMod val="60000"/>
                   <a:lumOff val="40000"/>
                 </a:schemeClr>
               </a:gs>
-              <a:gs pos="38000">
-                <a:schemeClr val="accent1">
-                  <a:lumMod val="60000"/>
-                  <a:lumOff val="40000"/>
-                </a:schemeClr>
-              </a:gs>
-              <a:gs pos="65000">
-                <a:schemeClr val="accent3">
-                  <a:lumMod val="60000"/>
-                  <a:lumOff val="40000"/>
-                </a:schemeClr>
-              </a:gs>
             </a:gsLst>
-            <a:path path="circle">
-              <a:fillToRect l="100000" t="100000"/>
-            </a:path>
-            <a:tileRect r="-100000" b="-100000"/>
+            <a:lin ang="17340000" scaled="0"/>
+            <a:tileRect/>
           </a:gradFill>
+          <a:ln w="38100" cmpd="dbl"/>
         </p:spPr>
         <p:style>
           <a:lnRef idx="1">
@@ -2423,39 +2441,34 @@
               <a:t>SAMM</a:t>
             </a:r>
             <a:r>
+              <a:rPr lang="de-DE" sz="2000" dirty="0"/>
+              <a:t> </a:t>
+            </a:r>
+            <a:r>
               <a:rPr lang="de-DE" sz="2000" dirty="0" smtClean="0"/>
-              <a:t/>
-            </a:r>
-            <a:br>
-              <a:rPr lang="de-DE" sz="2000" dirty="0" smtClean="0"/>
-            </a:br>
-            <a:r>
-              <a:rPr lang="de-DE" sz="2000" dirty="0" smtClean="0"/>
-              <a:t>International</a:t>
+              <a:t>Inc.</a:t>
             </a:r>
           </a:p>
           <a:p>
             <a:pPr algn="ctr"/>
-            <a:r>
-              <a:rPr lang="de-DE" sz="2000" dirty="0" smtClean="0"/>
-              <a:t>AG</a:t>
-            </a:r>
             <a:endParaRPr lang="de-DE" sz="2000" dirty="0"/>
+          </a:p>
+          <a:p>
+            <a:pPr algn="ctr"/>
+            <a:endParaRPr lang="de-DE" sz="2000" dirty="0" smtClean="0"/>
           </a:p>
         </p:txBody>
       </p:sp>
       <p:cxnSp>
         <p:nvCxnSpPr>
           <p:cNvPr id="62" name="Gerade Verbindung mit Pfeil 61"/>
-          <p:cNvCxnSpPr>
-            <a:endCxn id="50" idx="2"/>
-          </p:cNvCxnSpPr>
+          <p:cNvCxnSpPr/>
           <p:nvPr/>
         </p:nvCxnSpPr>
         <p:spPr>
-          <a:xfrm flipV="1">
-            <a:off x="3703244" y="2239065"/>
-            <a:ext cx="2130435" cy="2913976"/>
+          <a:xfrm>
+            <a:off x="1052642" y="1719602"/>
+            <a:ext cx="1" cy="3077642"/>
           </a:xfrm>
           <a:prstGeom prst="straightConnector1">
             <a:avLst/>
@@ -2467,6 +2480,7 @@
                 <a:lumOff val="40000"/>
               </a:schemeClr>
             </a:solidFill>
+            <a:prstDash val="sysDash"/>
             <a:tailEnd type="arrow"/>
           </a:ln>
         </p:spPr>
@@ -2520,18 +2534,18 @@
           <a:p>
             <a:pPr algn="ctr"/>
             <a:r>
-              <a:rPr lang="de-DE" sz="1200" dirty="0" smtClean="0"/>
+              <a:rPr lang="de-DE" sz="1600" dirty="0" smtClean="0"/>
               <a:t>Gelb </a:t>
             </a:r>
             <a:r>
-              <a:rPr lang="de-DE" sz="1200" dirty="0" err="1" smtClean="0"/>
+              <a:rPr lang="de-DE" sz="1600" dirty="0" err="1" smtClean="0"/>
               <a:t>Finance</a:t>
             </a:r>
             <a:r>
-              <a:rPr lang="de-DE" sz="1200" dirty="0" smtClean="0"/>
+              <a:rPr lang="de-DE" sz="1600" dirty="0" smtClean="0"/>
               <a:t> AG</a:t>
             </a:r>
-            <a:endParaRPr lang="de-DE" sz="1200" dirty="0"/>
+            <a:endParaRPr lang="de-DE" sz="1600" dirty="0"/>
           </a:p>
         </p:txBody>
       </p:sp>
@@ -2551,13 +2565,15 @@
           <a:prstGeom prst="straightConnector1">
             <a:avLst/>
           </a:prstGeom>
-          <a:ln>
+          <a:ln w="22225">
             <a:solidFill>
               <a:schemeClr val="accent4">
                 <a:lumMod val="75000"/>
               </a:schemeClr>
             </a:solidFill>
-            <a:tailEnd type="arrow"/>
+            <a:prstDash val="sysDash"/>
+            <a:headEnd type="arrow" w="lg" len="med"/>
+            <a:tailEnd type="arrow" w="lg" len="med"/>
           </a:ln>
         </p:spPr>
         <p:style>
@@ -2583,8 +2599,8 @@
         </p:nvSpPr>
         <p:spPr>
           <a:xfrm>
-            <a:off x="6130603" y="5470526"/>
-            <a:ext cx="2135046" cy="693336"/>
+            <a:off x="6016887" y="4860635"/>
+            <a:ext cx="2270927" cy="592804"/>
           </a:xfrm>
           <a:prstGeom prst="rect">
             <a:avLst/>
@@ -2615,10 +2631,25 @@
           <a:p>
             <a:pPr algn="ctr"/>
             <a:r>
-              <a:rPr lang="de-DE" sz="1200" dirty="0" smtClean="0"/>
-              <a:t>Software-Töchter in Ungarn, Polen, Rumänien, Pakistan</a:t>
-            </a:r>
-            <a:endParaRPr lang="de-DE" sz="1200" dirty="0"/>
+              <a:rPr lang="de-DE" sz="1400" dirty="0" smtClean="0"/>
+              <a:t>Software-Töchter in </a:t>
+            </a:r>
+            <a:r>
+              <a:rPr lang="de-DE" sz="1400" dirty="0" smtClean="0"/>
+              <a:t/>
+            </a:r>
+            <a:br>
+              <a:rPr lang="de-DE" sz="1400" dirty="0" smtClean="0"/>
+            </a:br>
+            <a:r>
+              <a:rPr lang="de-DE" sz="1400" dirty="0" smtClean="0"/>
+              <a:t>Ungarn und </a:t>
+            </a:r>
+            <a:r>
+              <a:rPr lang="de-DE" sz="1400" dirty="0" smtClean="0"/>
+              <a:t>Pakistan</a:t>
+            </a:r>
+            <a:endParaRPr lang="de-DE" sz="1400" dirty="0"/>
           </a:p>
         </p:txBody>
       </p:sp>
@@ -2627,14 +2658,13 @@
           <p:cNvPr id="71" name="Gerade Verbindung mit Pfeil 70"/>
           <p:cNvCxnSpPr>
             <a:stCxn id="70" idx="0"/>
-            <a:endCxn id="61" idx="2"/>
           </p:cNvCxnSpPr>
           <p:nvPr/>
         </p:nvCxnSpPr>
         <p:spPr>
           <a:xfrm flipV="1">
-            <a:off x="7198126" y="1819371"/>
-            <a:ext cx="440450" cy="3651155"/>
+            <a:off x="7152351" y="1819371"/>
+            <a:ext cx="67543" cy="3041264"/>
           </a:xfrm>
           <a:prstGeom prst="straightConnector1">
             <a:avLst/>
@@ -2645,7 +2675,9 @@
                 <a:lumMod val="50000"/>
               </a:schemeClr>
             </a:solidFill>
-            <a:tailEnd type="arrow"/>
+            <a:prstDash val="sysDash"/>
+            <a:headEnd type="arrow"/>
+            <a:tailEnd type="none"/>
           </a:ln>
         </p:spPr>
         <p:style>
@@ -2674,8 +2706,8 @@
         </p:nvCxnSpPr>
         <p:spPr>
           <a:xfrm rot="5400000" flipH="1" flipV="1">
-            <a:off x="6211839" y="752758"/>
-            <a:ext cx="273347" cy="1029666"/>
+            <a:off x="6206648" y="678731"/>
+            <a:ext cx="204509" cy="1108883"/>
           </a:xfrm>
           <a:prstGeom prst="curvedConnector2">
             <a:avLst/>
@@ -2708,8 +2740,8 @@
         </p:nvSpPr>
         <p:spPr>
           <a:xfrm>
-            <a:off x="115761" y="1671017"/>
-            <a:ext cx="2023675" cy="573917"/>
+            <a:off x="170381" y="1145685"/>
+            <a:ext cx="2504033" cy="573917"/>
           </a:xfrm>
           <a:prstGeom prst="rect">
             <a:avLst/>
@@ -2719,6 +2751,14 @@
               <a:lumMod val="75000"/>
             </a:schemeClr>
           </a:solidFill>
+          <a:ln>
+            <a:solidFill>
+              <a:schemeClr val="tx1">
+                <a:lumMod val="75000"/>
+                <a:lumOff val="25000"/>
+              </a:schemeClr>
+            </a:solidFill>
+          </a:ln>
         </p:spPr>
         <p:style>
           <a:lnRef idx="1">
@@ -2770,8 +2810,8 @@
         </p:nvCxnSpPr>
         <p:spPr>
           <a:xfrm rot="16200000" flipH="1">
-            <a:off x="1808628" y="1563904"/>
-            <a:ext cx="227086" cy="1589145"/>
+            <a:off x="1775787" y="1366212"/>
+            <a:ext cx="489955" cy="1196733"/>
           </a:xfrm>
           <a:prstGeom prst="curvedConnector2">
             <a:avLst/>
@@ -2796,6 +2836,411 @@
           </a:fontRef>
         </p:style>
       </p:cxnSp>
+      <p:pic>
+        <p:nvPicPr>
+          <p:cNvPr id="2" name="Bild 1" descr="schatzkiste.png"/>
+          <p:cNvPicPr>
+            <a:picLocks noChangeAspect="1"/>
+          </p:cNvPicPr>
+          <p:nvPr/>
+        </p:nvPicPr>
+        <p:blipFill>
+          <a:blip r:embed="rId2">
+            <a:extLst>
+              <a:ext uri="{28A0092B-C50C-407E-A947-70E740481C1C}">
+                <a14:useLocalDpi xmlns:a14="http://schemas.microsoft.com/office/drawing/2010/main" val="0"/>
+              </a:ext>
+            </a:extLst>
+          </a:blip>
+          <a:stretch>
+            <a:fillRect/>
+          </a:stretch>
+        </p:blipFill>
+        <p:spPr>
+          <a:xfrm>
+            <a:off x="7344454" y="1117335"/>
+            <a:ext cx="670260" cy="636747"/>
+          </a:xfrm>
+          <a:prstGeom prst="rect">
+            <a:avLst/>
+          </a:prstGeom>
+        </p:spPr>
+      </p:pic>
+      <p:cxnSp>
+        <p:nvCxnSpPr>
+          <p:cNvPr id="51" name="Gerade Verbindung mit Pfeil 50"/>
+          <p:cNvCxnSpPr/>
+          <p:nvPr/>
+        </p:nvCxnSpPr>
+        <p:spPr>
+          <a:xfrm>
+            <a:off x="7801437" y="6227180"/>
+            <a:ext cx="797967" cy="0"/>
+          </a:xfrm>
+          <a:prstGeom prst="straightConnector1">
+            <a:avLst/>
+          </a:prstGeom>
+          <a:ln w="19050">
+            <a:solidFill>
+              <a:schemeClr val="bg1">
+                <a:lumMod val="50000"/>
+              </a:schemeClr>
+            </a:solidFill>
+            <a:prstDash val="sysDash"/>
+            <a:headEnd type="none" w="lg" len="med"/>
+            <a:tailEnd type="arrow" w="lg" len="med"/>
+          </a:ln>
+        </p:spPr>
+        <p:style>
+          <a:lnRef idx="2">
+            <a:schemeClr val="accent1"/>
+          </a:lnRef>
+          <a:fillRef idx="0">
+            <a:schemeClr val="accent1"/>
+          </a:fillRef>
+          <a:effectRef idx="1">
+            <a:schemeClr val="accent1"/>
+          </a:effectRef>
+          <a:fontRef idx="minor">
+            <a:schemeClr val="tx1"/>
+          </a:fontRef>
+        </p:style>
+      </p:cxnSp>
+      <p:sp>
+        <p:nvSpPr>
+          <p:cNvPr id="44" name="Textfeld 43"/>
+          <p:cNvSpPr txBox="1"/>
+          <p:nvPr/>
+        </p:nvSpPr>
+        <p:spPr>
+          <a:xfrm>
+            <a:off x="7656141" y="6223249"/>
+            <a:ext cx="1002398" cy="307777"/>
+          </a:xfrm>
+          <a:prstGeom prst="rect">
+            <a:avLst/>
+          </a:prstGeom>
+          <a:noFill/>
+        </p:spPr>
+        <p:txBody>
+          <a:bodyPr wrap="none" rtlCol="0">
+            <a:spAutoFit/>
+          </a:bodyPr>
+          <a:lstStyle/>
+          <a:p>
+            <a:r>
+              <a:rPr lang="de-DE" sz="1400" dirty="0" smtClean="0">
+                <a:solidFill>
+                  <a:schemeClr val="tx1">
+                    <a:lumMod val="50000"/>
+                    <a:lumOff val="50000"/>
+                  </a:schemeClr>
+                </a:solidFill>
+              </a:rPr>
+              <a:t>Beteiligung</a:t>
+            </a:r>
+            <a:endParaRPr lang="de-DE" sz="1400" dirty="0">
+              <a:solidFill>
+                <a:schemeClr val="tx1">
+                  <a:lumMod val="50000"/>
+                  <a:lumOff val="50000"/>
+                </a:schemeClr>
+              </a:solidFill>
+            </a:endParaRPr>
+          </a:p>
+        </p:txBody>
+      </p:sp>
+      <p:cxnSp>
+        <p:nvCxnSpPr>
+          <p:cNvPr id="78" name="Gerade Verbindung mit Pfeil 77"/>
+          <p:cNvCxnSpPr/>
+          <p:nvPr/>
+        </p:nvCxnSpPr>
+        <p:spPr>
+          <a:xfrm flipH="1">
+            <a:off x="3969017" y="2508963"/>
+            <a:ext cx="313942" cy="2288281"/>
+          </a:xfrm>
+          <a:prstGeom prst="straightConnector1">
+            <a:avLst/>
+          </a:prstGeom>
+          <a:ln>
+            <a:solidFill>
+              <a:schemeClr val="accent1">
+                <a:lumMod val="60000"/>
+                <a:lumOff val="40000"/>
+              </a:schemeClr>
+            </a:solidFill>
+            <a:prstDash val="solid"/>
+            <a:tailEnd type="arrow" w="lg" len="med"/>
+          </a:ln>
+        </p:spPr>
+        <p:style>
+          <a:lnRef idx="2">
+            <a:schemeClr val="accent1"/>
+          </a:lnRef>
+          <a:fillRef idx="0">
+            <a:schemeClr val="accent1"/>
+          </a:fillRef>
+          <a:effectRef idx="1">
+            <a:schemeClr val="accent1"/>
+          </a:effectRef>
+          <a:fontRef idx="minor">
+            <a:schemeClr val="tx1"/>
+          </a:fontRef>
+        </p:style>
+      </p:cxnSp>
+      <p:cxnSp>
+        <p:nvCxnSpPr>
+          <p:cNvPr id="83" name="Gerade Verbindung mit Pfeil 82"/>
+          <p:cNvCxnSpPr/>
+          <p:nvPr/>
+        </p:nvCxnSpPr>
+        <p:spPr>
+          <a:xfrm>
+            <a:off x="6673299" y="6221605"/>
+            <a:ext cx="797967" cy="0"/>
+          </a:xfrm>
+          <a:prstGeom prst="straightConnector1">
+            <a:avLst/>
+          </a:prstGeom>
+          <a:ln w="19050">
+            <a:solidFill>
+              <a:schemeClr val="bg1">
+                <a:lumMod val="50000"/>
+              </a:schemeClr>
+            </a:solidFill>
+            <a:prstDash val="solid"/>
+            <a:headEnd type="none" w="lg" len="med"/>
+            <a:tailEnd type="arrow" w="lg" len="med"/>
+          </a:ln>
+        </p:spPr>
+        <p:style>
+          <a:lnRef idx="2">
+            <a:schemeClr val="accent1"/>
+          </a:lnRef>
+          <a:fillRef idx="0">
+            <a:schemeClr val="accent1"/>
+          </a:fillRef>
+          <a:effectRef idx="1">
+            <a:schemeClr val="accent1"/>
+          </a:effectRef>
+          <a:fontRef idx="minor">
+            <a:schemeClr val="tx1"/>
+          </a:fontRef>
+        </p:style>
+      </p:cxnSp>
+      <p:sp>
+        <p:nvSpPr>
+          <p:cNvPr id="84" name="Textfeld 83"/>
+          <p:cNvSpPr txBox="1"/>
+          <p:nvPr/>
+        </p:nvSpPr>
+        <p:spPr>
+          <a:xfrm>
+            <a:off x="6541658" y="6204019"/>
+            <a:ext cx="1098302" cy="523220"/>
+          </a:xfrm>
+          <a:prstGeom prst="rect">
+            <a:avLst/>
+          </a:prstGeom>
+          <a:noFill/>
+        </p:spPr>
+        <p:txBody>
+          <a:bodyPr wrap="none" rtlCol="0">
+            <a:spAutoFit/>
+          </a:bodyPr>
+          <a:lstStyle/>
+          <a:p>
+            <a:r>
+              <a:rPr lang="de-DE" sz="1400" dirty="0" smtClean="0">
+                <a:solidFill>
+                  <a:schemeClr val="tx1">
+                    <a:lumMod val="50000"/>
+                    <a:lumOff val="50000"/>
+                  </a:schemeClr>
+                </a:solidFill>
+              </a:rPr>
+              <a:t>Übernahme,</a:t>
+            </a:r>
+            <a:br>
+              <a:rPr lang="de-DE" sz="1400" dirty="0" smtClean="0">
+                <a:solidFill>
+                  <a:schemeClr val="tx1">
+                    <a:lumMod val="50000"/>
+                    <a:lumOff val="50000"/>
+                  </a:schemeClr>
+                </a:solidFill>
+              </a:rPr>
+            </a:br>
+            <a:r>
+              <a:rPr lang="de-DE" sz="1400" dirty="0" smtClean="0">
+                <a:solidFill>
+                  <a:schemeClr val="tx1">
+                    <a:lumMod val="50000"/>
+                    <a:lumOff val="50000"/>
+                  </a:schemeClr>
+                </a:solidFill>
+              </a:rPr>
+              <a:t>Fusion</a:t>
+            </a:r>
+            <a:endParaRPr lang="de-DE" sz="1400" dirty="0">
+              <a:solidFill>
+                <a:schemeClr val="tx1">
+                  <a:lumMod val="50000"/>
+                  <a:lumOff val="50000"/>
+                </a:schemeClr>
+              </a:solidFill>
+            </a:endParaRPr>
+          </a:p>
+        </p:txBody>
+      </p:sp>
+      <p:sp>
+        <p:nvSpPr>
+          <p:cNvPr id="88" name="Rechteck 87"/>
+          <p:cNvSpPr/>
+          <p:nvPr/>
+        </p:nvSpPr>
+        <p:spPr>
+          <a:xfrm>
+            <a:off x="5874332" y="6092898"/>
+            <a:ext cx="2784207" cy="573917"/>
+          </a:xfrm>
+          <a:prstGeom prst="rect">
+            <a:avLst/>
+          </a:prstGeom>
+          <a:noFill/>
+          <a:ln w="6350" cmpd="sng">
+            <a:solidFill>
+              <a:schemeClr val="tx1">
+                <a:lumMod val="75000"/>
+                <a:lumOff val="25000"/>
+              </a:schemeClr>
+            </a:solidFill>
+          </a:ln>
+          <a:effectLst/>
+        </p:spPr>
+        <p:style>
+          <a:lnRef idx="1">
+            <a:schemeClr val="accent1"/>
+          </a:lnRef>
+          <a:fillRef idx="2">
+            <a:schemeClr val="accent1"/>
+          </a:fillRef>
+          <a:effectRef idx="1">
+            <a:schemeClr val="accent1"/>
+          </a:effectRef>
+          <a:fontRef idx="minor">
+            <a:schemeClr val="dk1"/>
+          </a:fontRef>
+        </p:style>
+        <p:txBody>
+          <a:bodyPr tIns="18000" rtlCol="0" anchor="t" anchorCtr="0"/>
+          <a:lstStyle/>
+          <a:p>
+            <a:r>
+              <a:rPr lang="de-DE" sz="1200" dirty="0" smtClean="0">
+                <a:solidFill>
+                  <a:schemeClr val="tx1">
+                    <a:lumMod val="65000"/>
+                    <a:lumOff val="35000"/>
+                  </a:schemeClr>
+                </a:solidFill>
+              </a:rPr>
+              <a:t>Legende</a:t>
+            </a:r>
+            <a:endParaRPr lang="de-DE" sz="1200" dirty="0">
+              <a:solidFill>
+                <a:schemeClr val="tx1">
+                  <a:lumMod val="65000"/>
+                  <a:lumOff val="35000"/>
+                </a:schemeClr>
+              </a:solidFill>
+            </a:endParaRPr>
+          </a:p>
+        </p:txBody>
+      </p:sp>
+      <p:cxnSp>
+        <p:nvCxnSpPr>
+          <p:cNvPr id="92" name="Gerade Verbindung mit Pfeil 91"/>
+          <p:cNvCxnSpPr/>
+          <p:nvPr/>
+        </p:nvCxnSpPr>
+        <p:spPr>
+          <a:xfrm flipH="1">
+            <a:off x="6411560" y="2103775"/>
+            <a:ext cx="130098" cy="1757023"/>
+          </a:xfrm>
+          <a:prstGeom prst="straightConnector1">
+            <a:avLst/>
+          </a:prstGeom>
+          <a:ln>
+            <a:solidFill>
+              <a:schemeClr val="accent3"/>
+            </a:solidFill>
+            <a:prstDash val="solid"/>
+            <a:tailEnd type="arrow" w="lg" len="med"/>
+          </a:ln>
+        </p:spPr>
+        <p:style>
+          <a:lnRef idx="2">
+            <a:schemeClr val="accent1"/>
+          </a:lnRef>
+          <a:fillRef idx="0">
+            <a:schemeClr val="accent1"/>
+          </a:fillRef>
+          <a:effectRef idx="1">
+            <a:schemeClr val="accent1"/>
+          </a:effectRef>
+          <a:fontRef idx="minor">
+            <a:schemeClr val="tx1"/>
+          </a:fontRef>
+        </p:style>
+      </p:cxnSp>
+      <p:sp>
+        <p:nvSpPr>
+          <p:cNvPr id="98" name="Textfeld 97"/>
+          <p:cNvSpPr txBox="1"/>
+          <p:nvPr/>
+        </p:nvSpPr>
+        <p:spPr>
+          <a:xfrm rot="16200000">
+            <a:off x="-539975" y="5995758"/>
+            <a:ext cx="1284163" cy="246221"/>
+          </a:xfrm>
+          <a:prstGeom prst="rect">
+            <a:avLst/>
+          </a:prstGeom>
+          <a:noFill/>
+        </p:spPr>
+        <p:txBody>
+          <a:bodyPr wrap="none" rtlCol="0">
+            <a:spAutoFit/>
+          </a:bodyPr>
+          <a:lstStyle/>
+          <a:p>
+            <a:r>
+              <a:rPr lang="de-DE" sz="1000" dirty="0" smtClean="0">
+                <a:solidFill>
+                  <a:schemeClr val="tx2">
+                    <a:lumMod val="60000"/>
+                    <a:lumOff val="40000"/>
+                  </a:schemeClr>
+                </a:solidFill>
+              </a:rPr>
+              <a:t>© 2015ff, SAMM Inc.</a:t>
+            </a:r>
+            <a:endParaRPr lang="de-DE" sz="1000" dirty="0">
+              <a:solidFill>
+                <a:schemeClr val="tx2">
+                  <a:lumMod val="60000"/>
+                  <a:lumOff val="40000"/>
+                </a:schemeClr>
+              </a:solidFill>
+            </a:endParaRPr>
+          </a:p>
+        </p:txBody>
+      </p:sp>
     </p:spTree>
     <p:extLst>
       <p:ext uri="{BB962C8B-B14F-4D97-AF65-F5344CB8AC3E}">
@@ -3457,6 +3902,15 @@
 </file>
 
 <file path=customXml/item1.xml><?xml version="1.0" encoding="utf-8"?>
+<p:properties xmlns:p="http://schemas.microsoft.com/office/2006/metadata/properties" xmlns:xsi="http://www.w3.org/2001/XMLSchema-instance" xmlns:pc="http://schemas.microsoft.com/office/infopath/2007/PartnerControls">
+  <documentManagement>
+    <_Version xmlns="http://schemas.microsoft.com/sharepoint/v3/fields" xsi:nil="true"/>
+    <_Status xmlns="http://schemas.microsoft.com/sharepoint/v3/fields">Not Started</_Status>
+  </documentManagement>
+</p:properties>
+</file>
+
+<file path=customXml/item2.xml><?xml version="1.0" encoding="utf-8"?>
 <ct:contentTypeSchema xmlns:ct="http://schemas.microsoft.com/office/2006/metadata/contentType" xmlns:ma="http://schemas.microsoft.com/office/2006/metadata/properties/metaAttributes" ct:_="" ma:_="" ma:contentTypeName="Document" ma:contentTypeID="0x0101000DE64AEEDD9B7A4D93545ACBE97D4615" ma:contentTypeVersion="2" ma:contentTypeDescription="Create a new document." ma:contentTypeScope="" ma:versionID="f49002b78e3a4a71b814eef46a983816">
   <xsd:schema xmlns:xsd="http://www.w3.org/2001/XMLSchema" xmlns:xs="http://www.w3.org/2001/XMLSchema" xmlns:p="http://schemas.microsoft.com/office/2006/metadata/properties" xmlns:ns2="http://schemas.microsoft.com/sharepoint/v3/fields" targetNamespace="http://schemas.microsoft.com/office/2006/metadata/properties" ma:root="true" ma:fieldsID="38f6db2dd0d9a0cf6a8dc37be32b365b" ns2:_="">
     <xsd:import namespace="http://schemas.microsoft.com/sharepoint/v3/fields"/>
@@ -3600,7 +4054,7 @@
 </ct:contentTypeSchema>
 </file>
 
-<file path=customXml/item2.xml><?xml version="1.0" encoding="utf-8"?>
+<file path=customXml/item3.xml><?xml version="1.0" encoding="utf-8"?>
 <?mso-contentType ?>
 <FormTemplates xmlns="http://schemas.microsoft.com/sharepoint/v3/contenttype/forms">
   <Display>DocumentLibraryForm</Display>
@@ -3609,16 +4063,17 @@
 </FormTemplates>
 </file>
 
-<file path=customXml/item3.xml><?xml version="1.0" encoding="utf-8"?>
-<p:properties xmlns:p="http://schemas.microsoft.com/office/2006/metadata/properties" xmlns:xsi="http://www.w3.org/2001/XMLSchema-instance" xmlns:pc="http://schemas.microsoft.com/office/infopath/2007/PartnerControls">
-  <documentManagement>
-    <_Version xmlns="http://schemas.microsoft.com/sharepoint/v3/fields" xsi:nil="true"/>
-    <_Status xmlns="http://schemas.microsoft.com/sharepoint/v3/fields">Not Started</_Status>
-  </documentManagement>
-</p:properties>
+<file path=customXml/itemProps1.xml><?xml version="1.0" encoding="utf-8"?>
+<ds:datastoreItem xmlns:ds="http://schemas.openxmlformats.org/officeDocument/2006/customXml" ds:itemID="{7B6F2769-7194-4217-93D3-3AF3A4742282}">
+  <ds:schemaRefs>
+    <ds:schemaRef ds:uri="http://schemas.microsoft.com/office/2006/metadata/properties"/>
+    <ds:schemaRef ds:uri="http://schemas.microsoft.com/office/infopath/2007/PartnerControls"/>
+    <ds:schemaRef ds:uri="http://schemas.microsoft.com/sharepoint/v3/fields"/>
+  </ds:schemaRefs>
+</ds:datastoreItem>
 </file>
 
-<file path=customXml/itemProps1.xml><?xml version="1.0" encoding="utf-8"?>
+<file path=customXml/itemProps2.xml><?xml version="1.0" encoding="utf-8"?>
 <ds:datastoreItem xmlns:ds="http://schemas.openxmlformats.org/officeDocument/2006/customXml" ds:itemID="{E4214858-785C-42F7-BE66-6D0E79395FC8}">
   <ds:schemaRefs>
     <ds:schemaRef ds:uri="http://schemas.microsoft.com/office/2006/metadata/contentType"/>
@@ -3636,20 +4091,10 @@
 </ds:datastoreItem>
 </file>
 
-<file path=customXml/itemProps2.xml><?xml version="1.0" encoding="utf-8"?>
+<file path=customXml/itemProps3.xml><?xml version="1.0" encoding="utf-8"?>
 <ds:datastoreItem xmlns:ds="http://schemas.openxmlformats.org/officeDocument/2006/customXml" ds:itemID="{87D2A1B0-FF3E-4009-940D-AED0EB70AA20}">
   <ds:schemaRefs>
     <ds:schemaRef ds:uri="http://schemas.microsoft.com/sharepoint/v3/contenttype/forms"/>
   </ds:schemaRefs>
 </ds:datastoreItem>
-</file>
-
-<file path=customXml/itemProps3.xml><?xml version="1.0" encoding="utf-8"?>
-<ds:datastoreItem xmlns:ds="http://schemas.openxmlformats.org/officeDocument/2006/customXml" ds:itemID="{7B6F2769-7194-4217-93D3-3AF3A4742282}">
-  <ds:schemaRefs>
-    <ds:schemaRef ds:uri="http://schemas.microsoft.com/office/2006/metadata/properties"/>
-    <ds:schemaRef ds:uri="http://schemas.microsoft.com/office/infopath/2007/PartnerControls"/>
-    <ds:schemaRef ds:uri="http://schemas.microsoft.com/sharepoint/v3/fields"/>
-  </ds:schemaRefs>
-</ds:datastoreItem>
 </file>
</xml_diff>

<commit_message>
Übernahme der HU und PK-Tochterunternehmen korrigiert
</commit_message>
<xml_diff>
--- a/graphics/samm-business-history.pptx
+++ b/graphics/samm-business-history.pptx
@@ -192,7 +192,7 @@
           <a:p>
             <a:fld id="{1C8FE042-0B66-6B40-B0E0-26B8EBC13308}" type="datetimeFigureOut">
               <a:rPr lang="de-DE" smtClean="0"/>
-              <a:t>26.04.15</a:t>
+              <a:t>27.04.15</a:t>
             </a:fld>
             <a:endParaRPr lang="de-DE"/>
           </a:p>
@@ -1710,7 +1710,7 @@
         </p:nvSpPr>
         <p:spPr>
           <a:xfrm>
-            <a:off x="235446" y="3318669"/>
+            <a:off x="300523" y="3121234"/>
             <a:ext cx="704640" cy="400110"/>
           </a:xfrm>
           <a:prstGeom prst="rect">
@@ -1740,7 +1740,7 @@
         </p:nvSpPr>
         <p:spPr>
           <a:xfrm>
-            <a:off x="2012104" y="3324537"/>
+            <a:off x="2077181" y="3127102"/>
             <a:ext cx="704640" cy="400110"/>
           </a:xfrm>
           <a:prstGeom prst="rect">
@@ -1770,7 +1770,7 @@
         </p:nvSpPr>
         <p:spPr>
           <a:xfrm>
-            <a:off x="3703244" y="3324537"/>
+            <a:off x="3768321" y="3127102"/>
             <a:ext cx="704640" cy="400110"/>
           </a:xfrm>
           <a:prstGeom prst="rect">
@@ -1800,7 +1800,7 @@
         </p:nvSpPr>
         <p:spPr>
           <a:xfrm>
-            <a:off x="5706920" y="3318669"/>
+            <a:off x="5644990" y="3121234"/>
             <a:ext cx="704640" cy="400110"/>
           </a:xfrm>
           <a:prstGeom prst="rect">
@@ -1830,7 +1830,7 @@
         </p:nvSpPr>
         <p:spPr>
           <a:xfrm>
-            <a:off x="7219894" y="3318669"/>
+            <a:off x="7217732" y="3121234"/>
             <a:ext cx="704640" cy="400110"/>
           </a:xfrm>
           <a:prstGeom prst="rect">
@@ -2187,7 +2187,7 @@
         <p:spPr>
           <a:xfrm>
             <a:off x="4835623" y="1335426"/>
-            <a:ext cx="1837675" cy="768349"/>
+            <a:ext cx="1925259" cy="768349"/>
           </a:xfrm>
           <a:prstGeom prst="rect">
             <a:avLst/>
@@ -2242,10 +2242,6 @@
               <a:rPr lang="de-DE" dirty="0" smtClean="0"/>
               <a:t> </a:t>
             </a:r>
-            <a:r>
-              <a:rPr lang="de-DE" dirty="0" smtClean="0"/>
-              <a:t/>
-            </a:r>
             <a:br>
               <a:rPr lang="de-DE" dirty="0" smtClean="0"/>
             </a:br>
@@ -2255,11 +2251,7 @@
             </a:r>
             <a:r>
               <a:rPr lang="de-DE" sz="1600" dirty="0" smtClean="0"/>
-              <a:t>Rot </a:t>
-            </a:r>
-            <a:r>
-              <a:rPr lang="de-DE" sz="1600" dirty="0" smtClean="0"/>
-              <a:t>Europa</a:t>
+              <a:t>Rot Europa</a:t>
             </a:r>
             <a:endParaRPr lang="de-DE" sz="1600" dirty="0"/>
           </a:p>
@@ -2634,20 +2626,12 @@
               <a:rPr lang="de-DE" sz="1400" dirty="0" smtClean="0"/>
               <a:t>Software-Töchter in </a:t>
             </a:r>
-            <a:r>
-              <a:rPr lang="de-DE" sz="1400" dirty="0" smtClean="0"/>
-              <a:t/>
-            </a:r>
             <a:br>
               <a:rPr lang="de-DE" sz="1400" dirty="0" smtClean="0"/>
             </a:br>
             <a:r>
               <a:rPr lang="de-DE" sz="1400" dirty="0" smtClean="0"/>
-              <a:t>Ungarn und </a:t>
-            </a:r>
-            <a:r>
-              <a:rPr lang="de-DE" sz="1400" dirty="0" smtClean="0"/>
-              <a:t>Pakistan</a:t>
+              <a:t>Ungarn und Pakistan</a:t>
             </a:r>
             <a:endParaRPr lang="de-DE" sz="1400" dirty="0"/>
           </a:p>
@@ -2656,15 +2640,13 @@
       <p:cxnSp>
         <p:nvCxnSpPr>
           <p:cNvPr id="71" name="Gerade Verbindung mit Pfeil 70"/>
-          <p:cNvCxnSpPr>
-            <a:stCxn id="70" idx="0"/>
-          </p:cNvCxnSpPr>
+          <p:cNvCxnSpPr/>
           <p:nvPr/>
         </p:nvCxnSpPr>
         <p:spPr>
-          <a:xfrm flipV="1">
-            <a:off x="7152351" y="1819371"/>
-            <a:ext cx="67543" cy="3041264"/>
+          <a:xfrm flipH="1" flipV="1">
+            <a:off x="6673299" y="2103775"/>
+            <a:ext cx="190046" cy="2756860"/>
           </a:xfrm>
           <a:prstGeom prst="straightConnector1">
             <a:avLst/>
@@ -2706,8 +2688,8 @@
         </p:nvCxnSpPr>
         <p:spPr>
           <a:xfrm rot="5400000" flipH="1" flipV="1">
-            <a:off x="6206648" y="678731"/>
-            <a:ext cx="204509" cy="1108883"/>
+            <a:off x="6228544" y="700627"/>
+            <a:ext cx="204509" cy="1065091"/>
           </a:xfrm>
           <a:prstGeom prst="curvedConnector2">
             <a:avLst/>
@@ -3167,9 +3149,9 @@
           <p:nvPr/>
         </p:nvCxnSpPr>
         <p:spPr>
-          <a:xfrm flipH="1">
+          <a:xfrm>
             <a:off x="6411560" y="2103775"/>
-            <a:ext cx="130098" cy="1757023"/>
+            <a:ext cx="0" cy="1757023"/>
           </a:xfrm>
           <a:prstGeom prst="straightConnector1">
             <a:avLst/>
@@ -3241,6 +3223,46 @@
           </a:p>
         </p:txBody>
       </p:sp>
+      <p:cxnSp>
+        <p:nvCxnSpPr>
+          <p:cNvPr id="42" name="Gerade Verbindung mit Pfeil 41"/>
+          <p:cNvCxnSpPr/>
+          <p:nvPr/>
+        </p:nvCxnSpPr>
+        <p:spPr>
+          <a:xfrm flipV="1">
+            <a:off x="7307099" y="1819371"/>
+            <a:ext cx="0" cy="3041264"/>
+          </a:xfrm>
+          <a:prstGeom prst="straightConnector1">
+            <a:avLst/>
+          </a:prstGeom>
+          <a:ln>
+            <a:solidFill>
+              <a:schemeClr val="bg1">
+                <a:lumMod val="50000"/>
+              </a:schemeClr>
+            </a:solidFill>
+            <a:prstDash val="solid"/>
+            <a:headEnd type="arrow"/>
+            <a:tailEnd type="none"/>
+          </a:ln>
+        </p:spPr>
+        <p:style>
+          <a:lnRef idx="2">
+            <a:schemeClr val="accent1"/>
+          </a:lnRef>
+          <a:fillRef idx="0">
+            <a:schemeClr val="accent1"/>
+          </a:fillRef>
+          <a:effectRef idx="1">
+            <a:schemeClr val="accent1"/>
+          </a:effectRef>
+          <a:fontRef idx="minor">
+            <a:schemeClr val="tx1"/>
+          </a:fontRef>
+        </p:style>
+      </p:cxnSp>
     </p:spTree>
     <p:extLst>
       <p:ext uri="{BB962C8B-B14F-4D97-AF65-F5344CB8AC3E}">
@@ -3902,6 +3924,15 @@
 </file>
 
 <file path=customXml/item1.xml><?xml version="1.0" encoding="utf-8"?>
+<?mso-contentType ?>
+<FormTemplates xmlns="http://schemas.microsoft.com/sharepoint/v3/contenttype/forms">
+  <Display>DocumentLibraryForm</Display>
+  <Edit>DocumentLibraryForm</Edit>
+  <New>DocumentLibraryForm</New>
+</FormTemplates>
+</file>
+
+<file path=customXml/item2.xml><?xml version="1.0" encoding="utf-8"?>
 <p:properties xmlns:p="http://schemas.microsoft.com/office/2006/metadata/properties" xmlns:xsi="http://www.w3.org/2001/XMLSchema-instance" xmlns:pc="http://schemas.microsoft.com/office/infopath/2007/PartnerControls">
   <documentManagement>
     <_Version xmlns="http://schemas.microsoft.com/sharepoint/v3/fields" xsi:nil="true"/>
@@ -3910,7 +3941,7 @@
 </p:properties>
 </file>
 
-<file path=customXml/item2.xml><?xml version="1.0" encoding="utf-8"?>
+<file path=customXml/item3.xml><?xml version="1.0" encoding="utf-8"?>
 <ct:contentTypeSchema xmlns:ct="http://schemas.microsoft.com/office/2006/metadata/contentType" xmlns:ma="http://schemas.microsoft.com/office/2006/metadata/properties/metaAttributes" ct:_="" ma:_="" ma:contentTypeName="Document" ma:contentTypeID="0x0101000DE64AEEDD9B7A4D93545ACBE97D4615" ma:contentTypeVersion="2" ma:contentTypeDescription="Create a new document." ma:contentTypeScope="" ma:versionID="f49002b78e3a4a71b814eef46a983816">
   <xsd:schema xmlns:xsd="http://www.w3.org/2001/XMLSchema" xmlns:xs="http://www.w3.org/2001/XMLSchema" xmlns:p="http://schemas.microsoft.com/office/2006/metadata/properties" xmlns:ns2="http://schemas.microsoft.com/sharepoint/v3/fields" targetNamespace="http://schemas.microsoft.com/office/2006/metadata/properties" ma:root="true" ma:fieldsID="38f6db2dd0d9a0cf6a8dc37be32b365b" ns2:_="">
     <xsd:import namespace="http://schemas.microsoft.com/sharepoint/v3/fields"/>
@@ -4054,16 +4085,15 @@
 </ct:contentTypeSchema>
 </file>
 
-<file path=customXml/item3.xml><?xml version="1.0" encoding="utf-8"?>
-<?mso-contentType ?>
-<FormTemplates xmlns="http://schemas.microsoft.com/sharepoint/v3/contenttype/forms">
-  <Display>DocumentLibraryForm</Display>
-  <Edit>DocumentLibraryForm</Edit>
-  <New>DocumentLibraryForm</New>
-</FormTemplates>
+<file path=customXml/itemProps1.xml><?xml version="1.0" encoding="utf-8"?>
+<ds:datastoreItem xmlns:ds="http://schemas.openxmlformats.org/officeDocument/2006/customXml" ds:itemID="{87D2A1B0-FF3E-4009-940D-AED0EB70AA20}">
+  <ds:schemaRefs>
+    <ds:schemaRef ds:uri="http://schemas.microsoft.com/sharepoint/v3/contenttype/forms"/>
+  </ds:schemaRefs>
+</ds:datastoreItem>
 </file>
 
-<file path=customXml/itemProps1.xml><?xml version="1.0" encoding="utf-8"?>
+<file path=customXml/itemProps2.xml><?xml version="1.0" encoding="utf-8"?>
 <ds:datastoreItem xmlns:ds="http://schemas.openxmlformats.org/officeDocument/2006/customXml" ds:itemID="{7B6F2769-7194-4217-93D3-3AF3A4742282}">
   <ds:schemaRefs>
     <ds:schemaRef ds:uri="http://schemas.microsoft.com/office/2006/metadata/properties"/>
@@ -4073,7 +4103,7 @@
 </ds:datastoreItem>
 </file>
 
-<file path=customXml/itemProps2.xml><?xml version="1.0" encoding="utf-8"?>
+<file path=customXml/itemProps3.xml><?xml version="1.0" encoding="utf-8"?>
 <ds:datastoreItem xmlns:ds="http://schemas.openxmlformats.org/officeDocument/2006/customXml" ds:itemID="{E4214858-785C-42F7-BE66-6D0E79395FC8}">
   <ds:schemaRefs>
     <ds:schemaRef ds:uri="http://schemas.microsoft.com/office/2006/metadata/contentType"/>
@@ -4089,12 +4119,4 @@
     <ds:schemaRef ds:uri="http://schemas.microsoft.com/internal/obd"/>
   </ds:schemaRefs>
 </ds:datastoreItem>
-</file>
-
-<file path=customXml/itemProps3.xml><?xml version="1.0" encoding="utf-8"?>
-<ds:datastoreItem xmlns:ds="http://schemas.openxmlformats.org/officeDocument/2006/customXml" ds:itemID="{87D2A1B0-FF3E-4009-940D-AED0EB70AA20}">
-  <ds:schemaRefs>
-    <ds:schemaRef ds:uri="http://schemas.microsoft.com/sharepoint/v3/contenttype/forms"/>
-  </ds:schemaRefs>
-</ds:datastoreItem>
 </file>
</xml_diff>

<commit_message>
Gelb/Rot aneinander beteiligt, im Diagramm dargestellt
</commit_message>
<xml_diff>
--- a/graphics/samm-business-history.pptx
+++ b/graphics/samm-business-history.pptx
@@ -192,7 +192,7 @@
           <a:p>
             <a:fld id="{1C8FE042-0B66-6B40-B0E0-26B8EBC13308}" type="datetimeFigureOut">
               <a:rPr lang="de-DE" smtClean="0"/>
-              <a:t>27.04.15</a:t>
+              <a:t>29.04.15</a:t>
             </a:fld>
             <a:endParaRPr lang="de-DE"/>
           </a:p>
@@ -2499,8 +2499,8 @@
         </p:nvSpPr>
         <p:spPr>
           <a:xfrm>
-            <a:off x="3969016" y="430494"/>
-            <a:ext cx="1589522" cy="473120"/>
+            <a:off x="3550405" y="430494"/>
+            <a:ext cx="2247847" cy="473120"/>
           </a:xfrm>
           <a:prstGeom prst="rect">
             <a:avLst/>
@@ -2551,8 +2551,8 @@
         </p:nvCxnSpPr>
         <p:spPr>
           <a:xfrm>
-            <a:off x="5558538" y="667054"/>
-            <a:ext cx="1304807" cy="151083"/>
+            <a:off x="5798252" y="667054"/>
+            <a:ext cx="1065093" cy="151083"/>
           </a:xfrm>
           <a:prstGeom prst="straightConnector1">
             <a:avLst/>
@@ -3246,6 +3246,46 @@
             <a:prstDash val="solid"/>
             <a:headEnd type="arrow"/>
             <a:tailEnd type="none"/>
+          </a:ln>
+        </p:spPr>
+        <p:style>
+          <a:lnRef idx="2">
+            <a:schemeClr val="accent1"/>
+          </a:lnRef>
+          <a:fillRef idx="0">
+            <a:schemeClr val="accent1"/>
+          </a:fillRef>
+          <a:effectRef idx="1">
+            <a:schemeClr val="accent1"/>
+          </a:effectRef>
+          <a:fontRef idx="minor">
+            <a:schemeClr val="tx1"/>
+          </a:fontRef>
+        </p:style>
+      </p:cxnSp>
+      <p:cxnSp>
+        <p:nvCxnSpPr>
+          <p:cNvPr id="45" name="Gerade Verbindung mit Pfeil 44"/>
+          <p:cNvCxnSpPr/>
+          <p:nvPr/>
+        </p:nvCxnSpPr>
+        <p:spPr>
+          <a:xfrm flipH="1">
+            <a:off x="3386250" y="933450"/>
+            <a:ext cx="245776" cy="976700"/>
+          </a:xfrm>
+          <a:prstGeom prst="straightConnector1">
+            <a:avLst/>
+          </a:prstGeom>
+          <a:ln w="22225">
+            <a:solidFill>
+              <a:schemeClr val="accent4">
+                <a:lumMod val="75000"/>
+              </a:schemeClr>
+            </a:solidFill>
+            <a:prstDash val="sysDash"/>
+            <a:headEnd type="arrow" w="lg" len="med"/>
+            <a:tailEnd type="arrow" w="lg" len="med"/>
           </a:ln>
         </p:spPr>
         <p:style>
@@ -3924,24 +3964,6 @@
 </file>
 
 <file path=customXml/item1.xml><?xml version="1.0" encoding="utf-8"?>
-<?mso-contentType ?>
-<FormTemplates xmlns="http://schemas.microsoft.com/sharepoint/v3/contenttype/forms">
-  <Display>DocumentLibraryForm</Display>
-  <Edit>DocumentLibraryForm</Edit>
-  <New>DocumentLibraryForm</New>
-</FormTemplates>
-</file>
-
-<file path=customXml/item2.xml><?xml version="1.0" encoding="utf-8"?>
-<p:properties xmlns:p="http://schemas.microsoft.com/office/2006/metadata/properties" xmlns:xsi="http://www.w3.org/2001/XMLSchema-instance" xmlns:pc="http://schemas.microsoft.com/office/infopath/2007/PartnerControls">
-  <documentManagement>
-    <_Version xmlns="http://schemas.microsoft.com/sharepoint/v3/fields" xsi:nil="true"/>
-    <_Status xmlns="http://schemas.microsoft.com/sharepoint/v3/fields">Not Started</_Status>
-  </documentManagement>
-</p:properties>
-</file>
-
-<file path=customXml/item3.xml><?xml version="1.0" encoding="utf-8"?>
 <ct:contentTypeSchema xmlns:ct="http://schemas.microsoft.com/office/2006/metadata/contentType" xmlns:ma="http://schemas.microsoft.com/office/2006/metadata/properties/metaAttributes" ct:_="" ma:_="" ma:contentTypeName="Document" ma:contentTypeID="0x0101000DE64AEEDD9B7A4D93545ACBE97D4615" ma:contentTypeVersion="2" ma:contentTypeDescription="Create a new document." ma:contentTypeScope="" ma:versionID="f49002b78e3a4a71b814eef46a983816">
   <xsd:schema xmlns:xsd="http://www.w3.org/2001/XMLSchema" xmlns:xs="http://www.w3.org/2001/XMLSchema" xmlns:p="http://schemas.microsoft.com/office/2006/metadata/properties" xmlns:ns2="http://schemas.microsoft.com/sharepoint/v3/fields" targetNamespace="http://schemas.microsoft.com/office/2006/metadata/properties" ma:root="true" ma:fieldsID="38f6db2dd0d9a0cf6a8dc37be32b365b" ns2:_="">
     <xsd:import namespace="http://schemas.microsoft.com/sharepoint/v3/fields"/>
@@ -4085,25 +4107,25 @@
 </ct:contentTypeSchema>
 </file>
 
-<file path=customXml/itemProps1.xml><?xml version="1.0" encoding="utf-8"?>
-<ds:datastoreItem xmlns:ds="http://schemas.openxmlformats.org/officeDocument/2006/customXml" ds:itemID="{87D2A1B0-FF3E-4009-940D-AED0EB70AA20}">
-  <ds:schemaRefs>
-    <ds:schemaRef ds:uri="http://schemas.microsoft.com/sharepoint/v3/contenttype/forms"/>
-  </ds:schemaRefs>
-</ds:datastoreItem>
+<file path=customXml/item2.xml><?xml version="1.0" encoding="utf-8"?>
+<?mso-contentType ?>
+<FormTemplates xmlns="http://schemas.microsoft.com/sharepoint/v3/contenttype/forms">
+  <Display>DocumentLibraryForm</Display>
+  <Edit>DocumentLibraryForm</Edit>
+  <New>DocumentLibraryForm</New>
+</FormTemplates>
 </file>
 
-<file path=customXml/itemProps2.xml><?xml version="1.0" encoding="utf-8"?>
-<ds:datastoreItem xmlns:ds="http://schemas.openxmlformats.org/officeDocument/2006/customXml" ds:itemID="{7B6F2769-7194-4217-93D3-3AF3A4742282}">
-  <ds:schemaRefs>
-    <ds:schemaRef ds:uri="http://schemas.microsoft.com/office/2006/metadata/properties"/>
-    <ds:schemaRef ds:uri="http://schemas.microsoft.com/office/infopath/2007/PartnerControls"/>
-    <ds:schemaRef ds:uri="http://schemas.microsoft.com/sharepoint/v3/fields"/>
-  </ds:schemaRefs>
-</ds:datastoreItem>
+<file path=customXml/item3.xml><?xml version="1.0" encoding="utf-8"?>
+<p:properties xmlns:p="http://schemas.microsoft.com/office/2006/metadata/properties" xmlns:xsi="http://www.w3.org/2001/XMLSchema-instance" xmlns:pc="http://schemas.microsoft.com/office/infopath/2007/PartnerControls">
+  <documentManagement>
+    <_Version xmlns="http://schemas.microsoft.com/sharepoint/v3/fields" xsi:nil="true"/>
+    <_Status xmlns="http://schemas.microsoft.com/sharepoint/v3/fields">Not Started</_Status>
+  </documentManagement>
+</p:properties>
 </file>
 
-<file path=customXml/itemProps3.xml><?xml version="1.0" encoding="utf-8"?>
+<file path=customXml/itemProps1.xml><?xml version="1.0" encoding="utf-8"?>
 <ds:datastoreItem xmlns:ds="http://schemas.openxmlformats.org/officeDocument/2006/customXml" ds:itemID="{E4214858-785C-42F7-BE66-6D0E79395FC8}">
   <ds:schemaRefs>
     <ds:schemaRef ds:uri="http://schemas.microsoft.com/office/2006/metadata/contentType"/>
@@ -4119,4 +4141,22 @@
     <ds:schemaRef ds:uri="http://schemas.microsoft.com/internal/obd"/>
   </ds:schemaRefs>
 </ds:datastoreItem>
+</file>
+
+<file path=customXml/itemProps2.xml><?xml version="1.0" encoding="utf-8"?>
+<ds:datastoreItem xmlns:ds="http://schemas.openxmlformats.org/officeDocument/2006/customXml" ds:itemID="{87D2A1B0-FF3E-4009-940D-AED0EB70AA20}">
+  <ds:schemaRefs>
+    <ds:schemaRef ds:uri="http://schemas.microsoft.com/sharepoint/v3/contenttype/forms"/>
+  </ds:schemaRefs>
+</ds:datastoreItem>
+</file>
+
+<file path=customXml/itemProps3.xml><?xml version="1.0" encoding="utf-8"?>
+<ds:datastoreItem xmlns:ds="http://schemas.openxmlformats.org/officeDocument/2006/customXml" ds:itemID="{7B6F2769-7194-4217-93D3-3AF3A4742282}">
+  <ds:schemaRefs>
+    <ds:schemaRef ds:uri="http://schemas.microsoft.com/office/2006/metadata/properties"/>
+    <ds:schemaRef ds:uri="http://schemas.microsoft.com/office/infopath/2007/PartnerControls"/>
+    <ds:schemaRef ds:uri="http://schemas.microsoft.com/sharepoint/v3/fields"/>
+  </ds:schemaRefs>
+</ds:datastoreItem>
 </file>
</xml_diff>

<commit_message>
updates during architecture workshop in Duesseldorf (with Bitboss)
</commit_message>
<xml_diff>
--- a/graphics/samm-business-history.pptx
+++ b/graphics/samm-business-history.pptx
@@ -107,6 +107,22 @@
       </a:defRPr>
     </a:lvl9pPr>
   </p:defaultTextStyle>
+  <p:extLst>
+    <p:ext uri="{EFAFB233-063F-42B5-8137-9DF3F51BA10A}">
+      <p15:sldGuideLst xmlns:p15="http://schemas.microsoft.com/office/powerpoint/2012/main">
+        <p15:guide id="1" orient="horz" pos="588">
+          <p15:clr>
+            <a:srgbClr val="A4A3A4"/>
+          </p15:clr>
+        </p15:guide>
+        <p15:guide id="2" pos="5759">
+          <p15:clr>
+            <a:srgbClr val="A4A3A4"/>
+          </p15:clr>
+        </p15:guide>
+      </p15:sldGuideLst>
+    </p:ext>
+  </p:extLst>
 </p:presentation>
 </file>
 
@@ -192,7 +208,7 @@
           <a:p>
             <a:fld id="{1C8FE042-0B66-6B40-B0E0-26B8EBC13308}" type="datetimeFigureOut">
               <a:rPr lang="de-DE" smtClean="0"/>
-              <a:t>29.04.15</a:t>
+              <a:t>06.04.17</a:t>
             </a:fld>
             <a:endParaRPr lang="de-DE"/>
           </a:p>
@@ -1676,9 +1692,9 @@
           <p:nvPr/>
         </p:nvCxnSpPr>
         <p:spPr>
-          <a:xfrm flipV="1">
-            <a:off x="170381" y="3150717"/>
-            <a:ext cx="8117433" cy="24422"/>
+          <a:xfrm>
+            <a:off x="170381" y="3101408"/>
+            <a:ext cx="8841097" cy="60080"/>
           </a:xfrm>
           <a:prstGeom prst="straightConnector1">
             <a:avLst/>
@@ -1800,7 +1816,7 @@
         </p:nvSpPr>
         <p:spPr>
           <a:xfrm>
-            <a:off x="5644990" y="3121234"/>
+            <a:off x="5393199" y="3121234"/>
             <a:ext cx="704640" cy="400110"/>
           </a:xfrm>
           <a:prstGeom prst="rect">
@@ -1830,7 +1846,7 @@
         </p:nvSpPr>
         <p:spPr>
           <a:xfrm>
-            <a:off x="7217732" y="3121234"/>
+            <a:off x="6714149" y="3121234"/>
             <a:ext cx="704640" cy="400110"/>
           </a:xfrm>
           <a:prstGeom prst="rect">
@@ -1952,7 +1968,7 @@
         <p:spPr>
           <a:xfrm>
             <a:off x="2619131" y="1910150"/>
-            <a:ext cx="2107137" cy="598813"/>
+            <a:ext cx="1670275" cy="598813"/>
           </a:xfrm>
           <a:prstGeom prst="rect">
             <a:avLst/>
@@ -1993,8 +2009,8 @@
         </p:nvSpPr>
         <p:spPr>
           <a:xfrm>
-            <a:off x="1734262" y="5792692"/>
-            <a:ext cx="2799332" cy="430557"/>
+            <a:off x="1734261" y="5792692"/>
+            <a:ext cx="3121491" cy="430557"/>
           </a:xfrm>
           <a:prstGeom prst="rect">
             <a:avLst/>
@@ -2116,7 +2132,7 @@
           <a:p>
             <a:pPr algn="ctr"/>
             <a:r>
-              <a:rPr lang="de-DE" sz="1600" dirty="0" err="1" smtClean="0"/>
+              <a:rPr lang="de-DE" sz="1600" dirty="0" smtClean="0"/>
               <a:t>WebDev</a:t>
             </a:r>
             <a:r>
@@ -2142,18 +2158,19 @@
         <p:nvCxnSpPr>
           <p:cNvPr id="32" name="Gekrümmte Verbindung 31"/>
           <p:cNvCxnSpPr>
-            <a:stCxn id="26" idx="3"/>
             <a:endCxn id="30" idx="2"/>
           </p:cNvCxnSpPr>
           <p:nvPr/>
         </p:nvCxnSpPr>
         <p:spPr>
-          <a:xfrm flipV="1">
-            <a:off x="4533594" y="4538740"/>
-            <a:ext cx="1093219" cy="1469231"/>
-          </a:xfrm>
-          <a:prstGeom prst="curvedConnector2">
-            <a:avLst/>
+          <a:xfrm rot="5400000" flipH="1" flipV="1">
+            <a:off x="4458561" y="4624441"/>
+            <a:ext cx="1253952" cy="1082551"/>
+          </a:xfrm>
+          <a:prstGeom prst="curvedConnector3">
+            <a:avLst>
+              <a:gd name="adj1" fmla="val 50000"/>
+            </a:avLst>
           </a:prstGeom>
           <a:ln>
             <a:solidFill>
@@ -2186,8 +2203,8 @@
         </p:nvSpPr>
         <p:spPr>
           <a:xfrm>
-            <a:off x="4835623" y="1335426"/>
-            <a:ext cx="1925259" cy="768349"/>
+            <a:off x="4342321" y="1335426"/>
+            <a:ext cx="2418562" cy="907479"/>
           </a:xfrm>
           <a:prstGeom prst="rect">
             <a:avLst/>
@@ -2233,7 +2250,6 @@
           <a:bodyPr rtlCol="0" anchor="ctr"/>
           <a:lstStyle/>
           <a:p>
-            <a:pPr algn="ctr"/>
             <a:r>
               <a:rPr lang="de-DE" sz="2000" dirty="0" smtClean="0"/>
               <a:t>Rot Holding</a:t>
@@ -2307,8 +2323,8 @@
         </p:nvCxnSpPr>
         <p:spPr>
           <a:xfrm>
-            <a:off x="4726268" y="2508963"/>
-            <a:ext cx="900545" cy="1351835"/>
+            <a:off x="4278853" y="2508963"/>
+            <a:ext cx="1347960" cy="1351835"/>
           </a:xfrm>
           <a:prstGeom prst="straightConnector1">
             <a:avLst/>
@@ -2349,8 +2365,8 @@
         </p:nvCxnSpPr>
         <p:spPr>
           <a:xfrm rot="5400000" flipH="1" flipV="1">
-            <a:off x="4158887" y="1233415"/>
-            <a:ext cx="190549" cy="1162923"/>
+            <a:off x="3837803" y="1405632"/>
+            <a:ext cx="120984" cy="888052"/>
           </a:xfrm>
           <a:prstGeom prst="curvedConnector2">
             <a:avLst/>
@@ -2383,8 +2399,8 @@
         </p:nvSpPr>
         <p:spPr>
           <a:xfrm>
-            <a:off x="6863344" y="442463"/>
-            <a:ext cx="1736059" cy="1376908"/>
+            <a:off x="6876596" y="442462"/>
+            <a:ext cx="1736059" cy="1643615"/>
           </a:xfrm>
           <a:prstGeom prst="rect">
             <a:avLst/>
@@ -2397,14 +2413,14 @@
                   <a:lumOff val="40000"/>
                 </a:schemeClr>
               </a:gs>
-              <a:gs pos="75000">
+              <a:gs pos="49000">
                 <a:schemeClr val="accent4">
                   <a:lumMod val="60000"/>
                   <a:lumOff val="40000"/>
                 </a:schemeClr>
               </a:gs>
             </a:gsLst>
-            <a:lin ang="17340000" scaled="0"/>
+            <a:lin ang="18900000" scaled="1"/>
             <a:tileRect/>
           </a:gradFill>
           <a:ln w="38100" cmpd="dbl"/>
@@ -2428,18 +2444,7 @@
           <a:lstStyle/>
           <a:p>
             <a:pPr algn="ctr"/>
-            <a:r>
-              <a:rPr lang="de-DE" sz="2400" b="1" dirty="0" smtClean="0"/>
-              <a:t>SAMM</a:t>
-            </a:r>
-            <a:r>
-              <a:rPr lang="de-DE" sz="2000" dirty="0"/>
-              <a:t> </a:t>
-            </a:r>
-            <a:r>
-              <a:rPr lang="de-DE" sz="2000" dirty="0" smtClean="0"/>
-              <a:t>Inc.</a:t>
-            </a:r>
+            <a:endParaRPr lang="de-DE" sz="2000" dirty="0" smtClean="0"/>
           </a:p>
           <a:p>
             <a:pPr algn="ctr"/>
@@ -2624,7 +2629,11 @@
             <a:pPr algn="ctr"/>
             <a:r>
               <a:rPr lang="de-DE" sz="1400" dirty="0" smtClean="0"/>
-              <a:t>Software-Töchter in </a:t>
+              <a:t>Tochterunternehmen </a:t>
+            </a:r>
+            <a:r>
+              <a:rPr lang="de-DE" sz="1400" dirty="0" smtClean="0"/>
+              <a:t>in </a:t>
             </a:r>
             <a:br>
               <a:rPr lang="de-DE" sz="1400" dirty="0" smtClean="0"/>
@@ -2645,8 +2654,8 @@
         </p:nvCxnSpPr>
         <p:spPr>
           <a:xfrm flipH="1" flipV="1">
-            <a:off x="6673299" y="2103775"/>
-            <a:ext cx="190046" cy="2756860"/>
+            <a:off x="6582595" y="2260491"/>
+            <a:ext cx="280750" cy="2600144"/>
           </a:xfrm>
           <a:prstGeom prst="straightConnector1">
             <a:avLst/>
@@ -2682,14 +2691,13 @@
           <p:cNvPr id="77" name="Gekrümmte Verbindung 76"/>
           <p:cNvCxnSpPr>
             <a:stCxn id="50" idx="0"/>
-            <a:endCxn id="61" idx="1"/>
           </p:cNvCxnSpPr>
           <p:nvPr/>
         </p:nvCxnSpPr>
         <p:spPr>
           <a:xfrm rot="5400000" flipH="1" flipV="1">
-            <a:off x="6228544" y="700627"/>
-            <a:ext cx="204509" cy="1065091"/>
+            <a:off x="6055997" y="528079"/>
+            <a:ext cx="302953" cy="1311742"/>
           </a:xfrm>
           <a:prstGeom prst="curvedConnector2">
             <a:avLst/>
@@ -2840,8 +2848,8 @@
         </p:blipFill>
         <p:spPr>
           <a:xfrm>
-            <a:off x="7344454" y="1117335"/>
-            <a:ext cx="670260" cy="636747"/>
+            <a:off x="5952257" y="1477681"/>
+            <a:ext cx="640418" cy="608397"/>
           </a:xfrm>
           <a:prstGeom prst="rect">
             <a:avLst/>
@@ -2941,7 +2949,7 @@
         <p:spPr>
           <a:xfrm flipH="1">
             <a:off x="3969017" y="2508963"/>
-            <a:ext cx="313942" cy="2288281"/>
+            <a:ext cx="9537" cy="2288281"/>
           </a:xfrm>
           <a:prstGeom prst="straightConnector1">
             <a:avLst/>
@@ -3150,8 +3158,8 @@
         </p:nvCxnSpPr>
         <p:spPr>
           <a:xfrm>
-            <a:off x="6411560" y="2103775"/>
-            <a:ext cx="0" cy="1757023"/>
+            <a:off x="6207473" y="2242905"/>
+            <a:ext cx="204087" cy="1617893"/>
           </a:xfrm>
           <a:prstGeom prst="straightConnector1">
             <a:avLst/>
@@ -3231,8 +3239,8 @@
         </p:nvCxnSpPr>
         <p:spPr>
           <a:xfrm flipV="1">
-            <a:off x="7307099" y="1819371"/>
-            <a:ext cx="0" cy="3041264"/>
+            <a:off x="7307099" y="2086077"/>
+            <a:ext cx="111690" cy="2774558"/>
           </a:xfrm>
           <a:prstGeom prst="straightConnector1">
             <a:avLst/>
@@ -3303,6 +3311,60 @@
           </a:fontRef>
         </p:style>
       </p:cxnSp>
+      <p:pic>
+        <p:nvPicPr>
+          <p:cNvPr id="22" name="Bild 21"/>
+          <p:cNvPicPr>
+            <a:picLocks noChangeAspect="1"/>
+          </p:cNvPicPr>
+          <p:nvPr/>
+        </p:nvPicPr>
+        <p:blipFill>
+          <a:blip r:embed="rId3"/>
+          <a:stretch>
+            <a:fillRect/>
+          </a:stretch>
+        </p:blipFill>
+        <p:spPr>
+          <a:xfrm>
+            <a:off x="7166775" y="616172"/>
+            <a:ext cx="1171044" cy="1029489"/>
+          </a:xfrm>
+          <a:prstGeom prst="rect">
+            <a:avLst/>
+          </a:prstGeom>
+        </p:spPr>
+      </p:pic>
+      <p:sp>
+        <p:nvSpPr>
+          <p:cNvPr id="54" name="Textfeld 53"/>
+          <p:cNvSpPr txBox="1"/>
+          <p:nvPr/>
+        </p:nvSpPr>
+        <p:spPr>
+          <a:xfrm>
+            <a:off x="7915551" y="3141361"/>
+            <a:ext cx="704039" cy="400110"/>
+          </a:xfrm>
+          <a:prstGeom prst="rect">
+            <a:avLst/>
+          </a:prstGeom>
+          <a:noFill/>
+        </p:spPr>
+        <p:txBody>
+          <a:bodyPr wrap="none" rtlCol="0">
+            <a:spAutoFit/>
+          </a:bodyPr>
+          <a:lstStyle/>
+          <a:p>
+            <a:r>
+              <a:rPr lang="de-DE" sz="2000" smtClean="0"/>
+              <a:t>2018</a:t>
+            </a:r>
+            <a:endParaRPr lang="de-DE" sz="2000" dirty="0"/>
+          </a:p>
+        </p:txBody>
+      </p:sp>
     </p:spTree>
     <p:extLst>
       <p:ext uri="{BB962C8B-B14F-4D97-AF65-F5344CB8AC3E}">
@@ -3316,7 +3378,7 @@
   <p:timing>
     <p:tnLst>
       <p:par>
-        <p:cTn xmlns:p14="http://schemas.microsoft.com/office/powerpoint/2010/main" id="1" dur="indefinite" restart="never" nodeType="tmRoot"/>
+        <p:cTn id="1" dur="indefinite" restart="never" nodeType="tmRoot"/>
       </p:par>
     </p:tnLst>
   </p:timing>

</xml_diff>

<commit_message>
update Bausteinsicht + Kontext
</commit_message>
<xml_diff>
--- a/graphics/samm-business-history.pptx
+++ b/graphics/samm-business-history.pptx
@@ -208,7 +208,7 @@
           <a:p>
             <a:fld id="{1C8FE042-0B66-6B40-B0E0-26B8EBC13308}" type="datetimeFigureOut">
               <a:rPr lang="de-DE" smtClean="0"/>
-              <a:t>06.04.17</a:t>
+              <a:t>08.05.17</a:t>
             </a:fld>
             <a:endParaRPr lang="de-DE"/>
           </a:p>
@@ -1669,7 +1669,7 @@
 </file>
 
 <file path=ppt/slides/slide1.xml><?xml version="1.0" encoding="utf-8"?>
-<p:sld xmlns:a="http://schemas.openxmlformats.org/drawingml/2006/main" xmlns:r="http://schemas.openxmlformats.org/officeDocument/2006/relationships" xmlns:p="http://schemas.openxmlformats.org/presentationml/2006/main">
+<p:sld xmlns:a="http://schemas.openxmlformats.org/drawingml/2006/main" xmlns:r="http://schemas.openxmlformats.org/officeDocument/2006/relationships" xmlns:p="http://schemas.openxmlformats.org/presentationml/2006/main" showMasterSp="0">
   <p:cSld>
     <p:spTree>
       <p:nvGrpSpPr>
@@ -1967,8 +1967,8 @@
         </p:nvSpPr>
         <p:spPr>
           <a:xfrm>
-            <a:off x="2619131" y="1910150"/>
-            <a:ext cx="1670275" cy="598813"/>
+            <a:off x="2619132" y="2038725"/>
+            <a:ext cx="1431964" cy="470238"/>
           </a:xfrm>
           <a:prstGeom prst="rect">
             <a:avLst/>
@@ -2154,47 +2154,6 @@
           </a:p>
         </p:txBody>
       </p:sp>
-      <p:cxnSp>
-        <p:nvCxnSpPr>
-          <p:cNvPr id="32" name="Gekrümmte Verbindung 31"/>
-          <p:cNvCxnSpPr>
-            <a:endCxn id="30" idx="2"/>
-          </p:cNvCxnSpPr>
-          <p:nvPr/>
-        </p:nvCxnSpPr>
-        <p:spPr>
-          <a:xfrm rot="5400000" flipH="1" flipV="1">
-            <a:off x="4458561" y="4624441"/>
-            <a:ext cx="1253952" cy="1082551"/>
-          </a:xfrm>
-          <a:prstGeom prst="curvedConnector3">
-            <a:avLst>
-              <a:gd name="adj1" fmla="val 50000"/>
-            </a:avLst>
-          </a:prstGeom>
-          <a:ln>
-            <a:solidFill>
-              <a:srgbClr val="7EC251"/>
-            </a:solidFill>
-            <a:headEnd type="none"/>
-            <a:tailEnd type="arrow"/>
-          </a:ln>
-        </p:spPr>
-        <p:style>
-          <a:lnRef idx="2">
-            <a:schemeClr val="accent1"/>
-          </a:lnRef>
-          <a:fillRef idx="0">
-            <a:schemeClr val="accent1"/>
-          </a:fillRef>
-          <a:effectRef idx="1">
-            <a:schemeClr val="accent1"/>
-          </a:effectRef>
-          <a:fontRef idx="minor">
-            <a:schemeClr val="tx1"/>
-          </a:fontRef>
-        </p:style>
-      </p:cxnSp>
       <p:sp>
         <p:nvSpPr>
           <p:cNvPr id="50" name="Rechteck 49"/>
@@ -2282,7 +2241,7 @@
         <p:spPr>
           <a:xfrm>
             <a:off x="3209020" y="2508963"/>
-            <a:ext cx="0" cy="1351835"/>
+            <a:ext cx="0" cy="1425536"/>
           </a:xfrm>
           <a:prstGeom prst="straightConnector1">
             <a:avLst/>
@@ -2317,14 +2276,14 @@
         <p:nvCxnSpPr>
           <p:cNvPr id="53" name="Gerade Verbindung mit Pfeil 52"/>
           <p:cNvCxnSpPr>
-            <a:endCxn id="30" idx="0"/>
+            <a:stCxn id="19" idx="3"/>
           </p:cNvCxnSpPr>
           <p:nvPr/>
         </p:nvCxnSpPr>
         <p:spPr>
           <a:xfrm>
-            <a:off x="4278853" y="2508963"/>
-            <a:ext cx="1347960" cy="1351835"/>
+            <a:off x="4051096" y="2273844"/>
+            <a:ext cx="895539" cy="1593495"/>
           </a:xfrm>
           <a:prstGeom prst="straightConnector1">
             <a:avLst/>
@@ -2365,8 +2324,8 @@
         </p:nvCxnSpPr>
         <p:spPr>
           <a:xfrm rot="5400000" flipH="1" flipV="1">
-            <a:off x="3837803" y="1405632"/>
-            <a:ext cx="120984" cy="888052"/>
+            <a:off x="3713938" y="1410343"/>
+            <a:ext cx="249559" cy="1007207"/>
           </a:xfrm>
           <a:prstGeom prst="curvedConnector2">
             <a:avLst/>
@@ -2399,8 +2358,8 @@
         </p:nvSpPr>
         <p:spPr>
           <a:xfrm>
-            <a:off x="6876596" y="442462"/>
-            <a:ext cx="1736059" cy="1643615"/>
+            <a:off x="6863346" y="442463"/>
+            <a:ext cx="1749310" cy="1372820"/>
           </a:xfrm>
           <a:prstGeom prst="rect">
             <a:avLst/>
@@ -2629,11 +2588,7 @@
             <a:pPr algn="ctr"/>
             <a:r>
               <a:rPr lang="de-DE" sz="1400" dirty="0" smtClean="0"/>
-              <a:t>Tochterunternehmen </a:t>
-            </a:r>
-            <a:r>
-              <a:rPr lang="de-DE" sz="1400" dirty="0" smtClean="0"/>
-              <a:t>in </a:t>
+              <a:t>Tochterunternehmen in </a:t>
             </a:r>
             <a:br>
               <a:rPr lang="de-DE" sz="1400" dirty="0" smtClean="0"/>
@@ -2800,8 +2755,8 @@
         </p:nvCxnSpPr>
         <p:spPr>
           <a:xfrm rot="16200000" flipH="1">
-            <a:off x="1775787" y="1366212"/>
-            <a:ext cx="489955" cy="1196733"/>
+            <a:off x="1743644" y="1398356"/>
+            <a:ext cx="554242" cy="1196734"/>
           </a:xfrm>
           <a:prstGeom prst="curvedConnector2">
             <a:avLst/>
@@ -3194,9 +3149,9 @@
           <p:nvPr/>
         </p:nvSpPr>
         <p:spPr>
-          <a:xfrm rot="16200000">
-            <a:off x="-539975" y="5995758"/>
-            <a:ext cx="1284163" cy="246221"/>
+          <a:xfrm>
+            <a:off x="-18559" y="6475722"/>
+            <a:ext cx="947695" cy="246221"/>
           </a:xfrm>
           <a:prstGeom prst="rect">
             <a:avLst/>
@@ -3218,7 +3173,7 @@
                   </a:schemeClr>
                 </a:solidFill>
               </a:rPr>
-              <a:t>© 2015ff, SAMM Inc.</a:t>
+              <a:t>©  SAMM Inc.</a:t>
             </a:r>
             <a:endParaRPr lang="de-DE" sz="1000" dirty="0">
               <a:solidFill>
@@ -3239,8 +3194,8 @@
         </p:nvCxnSpPr>
         <p:spPr>
           <a:xfrm flipV="1">
-            <a:off x="7307099" y="2086077"/>
-            <a:ext cx="111690" cy="2774558"/>
+            <a:off x="7307099" y="1832869"/>
+            <a:ext cx="269068" cy="3027766"/>
           </a:xfrm>
           <a:prstGeom prst="straightConnector1">
             <a:avLst/>
@@ -3279,8 +3234,8 @@
         </p:nvCxnSpPr>
         <p:spPr>
           <a:xfrm flipH="1">
-            <a:off x="3386250" y="933450"/>
-            <a:ext cx="245776" cy="976700"/>
+            <a:off x="3209020" y="933450"/>
+            <a:ext cx="423006" cy="1105274"/>
           </a:xfrm>
           <a:prstGeom prst="straightConnector1">
             <a:avLst/>
@@ -3365,6 +3320,82 @@
           </a:p>
         </p:txBody>
       </p:sp>
+      <p:cxnSp>
+        <p:nvCxnSpPr>
+          <p:cNvPr id="49" name="Gerade Verbindung mit Pfeil 48"/>
+          <p:cNvCxnSpPr/>
+          <p:nvPr/>
+        </p:nvCxnSpPr>
+        <p:spPr>
+          <a:xfrm>
+            <a:off x="5158376" y="2260491"/>
+            <a:ext cx="153558" cy="1600307"/>
+          </a:xfrm>
+          <a:prstGeom prst="straightConnector1">
+            <a:avLst/>
+          </a:prstGeom>
+          <a:ln>
+            <a:solidFill>
+              <a:schemeClr val="accent3">
+                <a:lumMod val="75000"/>
+              </a:schemeClr>
+            </a:solidFill>
+            <a:prstDash val="sysDash"/>
+            <a:tailEnd type="arrow"/>
+          </a:ln>
+        </p:spPr>
+        <p:style>
+          <a:lnRef idx="2">
+            <a:schemeClr val="accent1"/>
+          </a:lnRef>
+          <a:fillRef idx="0">
+            <a:schemeClr val="accent1"/>
+          </a:fillRef>
+          <a:effectRef idx="1">
+            <a:schemeClr val="accent1"/>
+          </a:effectRef>
+          <a:fontRef idx="minor">
+            <a:schemeClr val="tx1"/>
+          </a:fontRef>
+        </p:style>
+      </p:cxnSp>
+      <p:cxnSp>
+        <p:nvCxnSpPr>
+          <p:cNvPr id="55" name="Gerade Verbindung mit Pfeil 54"/>
+          <p:cNvCxnSpPr/>
+          <p:nvPr/>
+        </p:nvCxnSpPr>
+        <p:spPr>
+          <a:xfrm flipH="1">
+            <a:off x="4332311" y="4564446"/>
+            <a:ext cx="517235" cy="1202539"/>
+          </a:xfrm>
+          <a:prstGeom prst="straightConnector1">
+            <a:avLst/>
+          </a:prstGeom>
+          <a:ln>
+            <a:solidFill>
+              <a:schemeClr val="accent3"/>
+            </a:solidFill>
+            <a:prstDash val="solid"/>
+            <a:tailEnd type="arrow" w="lg" len="med"/>
+          </a:ln>
+        </p:spPr>
+        <p:style>
+          <a:lnRef idx="2">
+            <a:schemeClr val="accent1"/>
+          </a:lnRef>
+          <a:fillRef idx="0">
+            <a:schemeClr val="accent1"/>
+          </a:fillRef>
+          <a:effectRef idx="1">
+            <a:schemeClr val="accent1"/>
+          </a:effectRef>
+          <a:fontRef idx="minor">
+            <a:schemeClr val="tx1"/>
+          </a:fontRef>
+        </p:style>
+      </p:cxnSp>
     </p:spTree>
     <p:extLst>
       <p:ext uri="{BB962C8B-B14F-4D97-AF65-F5344CB8AC3E}">

</xml_diff>